<commit_message>
actualizacion entrega 2 de septiembre
</commit_message>
<xml_diff>
--- a/fase 1/evidencias grupales/Presentación Proyecto.pptx
+++ b/fase 1/evidencias grupales/Presentación Proyecto.pptx
@@ -798,7 +798,7 @@
   <p:cSld>
     <p:spTree>
       <p:nvGrpSpPr>
-        <p:cNvPr id="56" name="Shape 56"/>
+        <p:cNvPr id="58" name="Shape 58"/>
         <p:cNvGrpSpPr/>
         <p:nvPr/>
       </p:nvGrpSpPr>
@@ -812,7 +812,7 @@
       </p:grpSpPr>
       <p:sp>
         <p:nvSpPr>
-          <p:cNvPr id="57" name="Google Shape;57;g3853b748671_0_175:notes"/>
+          <p:cNvPr id="59" name="Google Shape;59;g3853b748671_0_175:notes"/>
           <p:cNvSpPr/>
           <p:nvPr>
             <p:ph idx="2" type="sldImg"/>
@@ -847,7 +847,7 @@
       </p:sp>
       <p:sp>
         <p:nvSpPr>
-          <p:cNvPr id="58" name="Google Shape;58;g3853b748671_0_175:notes"/>
+          <p:cNvPr id="60" name="Google Shape;60;g3853b748671_0_175:notes"/>
           <p:cNvSpPr txBox="1"/>
           <p:nvPr>
             <p:ph idx="1" type="body"/>
@@ -897,7 +897,7 @@
   <p:cSld>
     <p:spTree>
       <p:nvGrpSpPr>
-        <p:cNvPr id="65" name="Shape 65"/>
+        <p:cNvPr id="67" name="Shape 67"/>
         <p:cNvGrpSpPr/>
         <p:nvPr/>
       </p:nvGrpSpPr>
@@ -911,7 +911,7 @@
       </p:grpSpPr>
       <p:sp>
         <p:nvSpPr>
-          <p:cNvPr id="66" name="Google Shape;66;g3853b748671_0_225:notes"/>
+          <p:cNvPr id="68" name="Google Shape;68;g3853b748671_0_225:notes"/>
           <p:cNvSpPr/>
           <p:nvPr>
             <p:ph idx="2" type="sldImg"/>
@@ -946,7 +946,7 @@
       </p:sp>
       <p:sp>
         <p:nvSpPr>
-          <p:cNvPr id="67" name="Google Shape;67;g3853b748671_0_225:notes"/>
+          <p:cNvPr id="69" name="Google Shape;69;g3853b748671_0_225:notes"/>
           <p:cNvSpPr txBox="1"/>
           <p:nvPr>
             <p:ph idx="1" type="body"/>
@@ -996,7 +996,7 @@
   <p:cSld>
     <p:spTree>
       <p:nvGrpSpPr>
-        <p:cNvPr id="76" name="Shape 76"/>
+        <p:cNvPr id="78" name="Shape 78"/>
         <p:cNvGrpSpPr/>
         <p:nvPr/>
       </p:nvGrpSpPr>
@@ -1010,7 +1010,7 @@
       </p:grpSpPr>
       <p:sp>
         <p:nvSpPr>
-          <p:cNvPr id="77" name="Google Shape;77;g3853b748671_0_230:notes"/>
+          <p:cNvPr id="79" name="Google Shape;79;g3853b748671_0_230:notes"/>
           <p:cNvSpPr/>
           <p:nvPr>
             <p:ph idx="2" type="sldImg"/>
@@ -1045,7 +1045,7 @@
       </p:sp>
       <p:sp>
         <p:nvSpPr>
-          <p:cNvPr id="78" name="Google Shape;78;g3853b748671_0_230:notes"/>
+          <p:cNvPr id="80" name="Google Shape;80;g3853b748671_0_230:notes"/>
           <p:cNvSpPr txBox="1"/>
           <p:nvPr>
             <p:ph idx="1" type="body"/>
@@ -1095,7 +1095,7 @@
   <p:cSld>
     <p:spTree>
       <p:nvGrpSpPr>
-        <p:cNvPr id="84" name="Shape 84"/>
+        <p:cNvPr id="86" name="Shape 86"/>
         <p:cNvGrpSpPr/>
         <p:nvPr/>
       </p:nvGrpSpPr>
@@ -1109,7 +1109,7 @@
       </p:grpSpPr>
       <p:sp>
         <p:nvSpPr>
-          <p:cNvPr id="85" name="Google Shape;85;g38550748119_1_19:notes"/>
+          <p:cNvPr id="87" name="Google Shape;87;g38550748119_1_19:notes"/>
           <p:cNvSpPr/>
           <p:nvPr>
             <p:ph idx="2" type="sldImg"/>
@@ -1144,7 +1144,7 @@
       </p:sp>
       <p:sp>
         <p:nvSpPr>
-          <p:cNvPr id="86" name="Google Shape;86;g38550748119_1_19:notes"/>
+          <p:cNvPr id="88" name="Google Shape;88;g38550748119_1_19:notes"/>
           <p:cNvSpPr txBox="1"/>
           <p:nvPr>
             <p:ph idx="1" type="body"/>
@@ -1194,7 +1194,7 @@
   <p:cSld>
     <p:spTree>
       <p:nvGrpSpPr>
-        <p:cNvPr id="91" name="Shape 91"/>
+        <p:cNvPr id="93" name="Shape 93"/>
         <p:cNvGrpSpPr/>
         <p:nvPr/>
       </p:nvGrpSpPr>
@@ -1208,7 +1208,7 @@
       </p:grpSpPr>
       <p:sp>
         <p:nvSpPr>
-          <p:cNvPr id="92" name="Google Shape;92;g3853b748671_0_240:notes"/>
+          <p:cNvPr id="94" name="Google Shape;94;g3853b748671_0_240:notes"/>
           <p:cNvSpPr/>
           <p:nvPr>
             <p:ph idx="2" type="sldImg"/>
@@ -1243,7 +1243,7 @@
       </p:sp>
       <p:sp>
         <p:nvSpPr>
-          <p:cNvPr id="93" name="Google Shape;93;g3853b748671_0_240:notes"/>
+          <p:cNvPr id="95" name="Google Shape;95;g3853b748671_0_240:notes"/>
           <p:cNvSpPr txBox="1"/>
           <p:nvPr>
             <p:ph idx="1" type="body"/>
@@ -1293,7 +1293,7 @@
   <p:cSld>
     <p:spTree>
       <p:nvGrpSpPr>
-        <p:cNvPr id="114" name="Shape 114"/>
+        <p:cNvPr id="116" name="Shape 116"/>
         <p:cNvGrpSpPr/>
         <p:nvPr/>
       </p:nvGrpSpPr>
@@ -1307,7 +1307,7 @@
       </p:grpSpPr>
       <p:sp>
         <p:nvSpPr>
-          <p:cNvPr id="115" name="Google Shape;115;g3853b748671_0_245:notes"/>
+          <p:cNvPr id="117" name="Google Shape;117;g3853b748671_0_245:notes"/>
           <p:cNvSpPr/>
           <p:nvPr>
             <p:ph idx="2" type="sldImg"/>
@@ -1342,7 +1342,7 @@
       </p:sp>
       <p:sp>
         <p:nvSpPr>
-          <p:cNvPr id="116" name="Google Shape;116;g3853b748671_0_245:notes"/>
+          <p:cNvPr id="118" name="Google Shape;118;g3853b748671_0_245:notes"/>
           <p:cNvSpPr txBox="1"/>
           <p:nvPr>
             <p:ph idx="1" type="body"/>
@@ -1392,7 +1392,7 @@
   <p:cSld>
     <p:spTree>
       <p:nvGrpSpPr>
-        <p:cNvPr id="120" name="Shape 120"/>
+        <p:cNvPr id="122" name="Shape 122"/>
         <p:cNvGrpSpPr/>
         <p:nvPr/>
       </p:nvGrpSpPr>
@@ -1406,7 +1406,7 @@
       </p:grpSpPr>
       <p:sp>
         <p:nvSpPr>
-          <p:cNvPr id="121" name="Google Shape;121;g3853b748671_0_250:notes"/>
+          <p:cNvPr id="123" name="Google Shape;123;g3853b748671_0_250:notes"/>
           <p:cNvSpPr/>
           <p:nvPr>
             <p:ph idx="2" type="sldImg"/>
@@ -1441,7 +1441,7 @@
       </p:sp>
       <p:sp>
         <p:nvSpPr>
-          <p:cNvPr id="122" name="Google Shape;122;g3853b748671_0_250:notes"/>
+          <p:cNvPr id="124" name="Google Shape;124;g3853b748671_0_250:notes"/>
           <p:cNvSpPr txBox="1"/>
           <p:nvPr>
             <p:ph idx="1" type="body"/>
@@ -1491,7 +1491,7 @@
   <p:cSld>
     <p:spTree>
       <p:nvGrpSpPr>
-        <p:cNvPr id="133" name="Shape 133"/>
+        <p:cNvPr id="135" name="Shape 135"/>
         <p:cNvGrpSpPr/>
         <p:nvPr/>
       </p:nvGrpSpPr>
@@ -1505,7 +1505,7 @@
       </p:grpSpPr>
       <p:sp>
         <p:nvSpPr>
-          <p:cNvPr id="134" name="Google Shape;134;g3853b748671_0_255:notes"/>
+          <p:cNvPr id="136" name="Google Shape;136;g3853b748671_0_255:notes"/>
           <p:cNvSpPr/>
           <p:nvPr>
             <p:ph idx="2" type="sldImg"/>
@@ -1540,7 +1540,7 @@
       </p:sp>
       <p:sp>
         <p:nvSpPr>
-          <p:cNvPr id="135" name="Google Shape;135;g3853b748671_0_255:notes"/>
+          <p:cNvPr id="137" name="Google Shape;137;g3853b748671_0_255:notes"/>
           <p:cNvSpPr txBox="1"/>
           <p:nvPr>
             <p:ph idx="1" type="body"/>
@@ -6433,6 +6433,173 @@
           </a:p>
         </p:txBody>
       </p:sp>
+      <p:sp>
+        <p:nvSpPr>
+          <p:cNvPr id="56" name="Google Shape;56;p13"/>
+          <p:cNvSpPr txBox="1"/>
+          <p:nvPr>
+            <p:ph idx="1" type="subTitle"/>
+          </p:nvPr>
+        </p:nvSpPr>
+        <p:spPr>
+          <a:xfrm>
+            <a:off x="5913025" y="4353650"/>
+            <a:ext cx="3193200" cy="754200"/>
+          </a:xfrm>
+          <a:prstGeom prst="rect">
+            <a:avLst/>
+          </a:prstGeom>
+          <a:effectLst>
+            <a:outerShdw blurRad="57150" rotWithShape="0" algn="bl" dir="5400000" dist="76200">
+              <a:srgbClr val="000000">
+                <a:alpha val="54000"/>
+              </a:srgbClr>
+            </a:outerShdw>
+          </a:effectLst>
+        </p:spPr>
+        <p:txBody>
+          <a:bodyPr anchorCtr="0" anchor="t" bIns="91425" lIns="91425" spcFirstLastPara="1" rIns="91425" wrap="square" tIns="91425">
+            <a:noAutofit/>
+          </a:bodyPr>
+          <a:lstStyle/>
+          <a:p>
+            <a:pPr indent="0" lvl="0" marL="0" rtl="0" algn="l">
+              <a:lnSpc>
+                <a:spcPct val="80000"/>
+              </a:lnSpc>
+              <a:spcBef>
+                <a:spcPts val="0"/>
+              </a:spcBef>
+              <a:spcAft>
+                <a:spcPts val="0"/>
+              </a:spcAft>
+              <a:buSzPts val="852"/>
+              <a:buNone/>
+            </a:pPr>
+            <a:r>
+              <a:rPr lang="es" sz="1270">
+                <a:solidFill>
+                  <a:schemeClr val="dk1"/>
+                </a:solidFill>
+                <a:latin typeface="Impact"/>
+                <a:ea typeface="Impact"/>
+                <a:cs typeface="Impact"/>
+                <a:sym typeface="Impact"/>
+              </a:rPr>
+              <a:t>Integrantes: Christoph Bornhardt ,  Joan Jara</a:t>
+            </a:r>
+            <a:endParaRPr sz="1270">
+              <a:solidFill>
+                <a:schemeClr val="dk1"/>
+              </a:solidFill>
+              <a:latin typeface="Impact"/>
+              <a:ea typeface="Impact"/>
+              <a:cs typeface="Impact"/>
+              <a:sym typeface="Impact"/>
+            </a:endParaRPr>
+          </a:p>
+          <a:p>
+            <a:pPr indent="0" lvl="0" marL="0" rtl="0" algn="l">
+              <a:lnSpc>
+                <a:spcPct val="80000"/>
+              </a:lnSpc>
+              <a:spcBef>
+                <a:spcPts val="0"/>
+              </a:spcBef>
+              <a:spcAft>
+                <a:spcPts val="0"/>
+              </a:spcAft>
+              <a:buSzPts val="852"/>
+              <a:buNone/>
+            </a:pPr>
+            <a:r>
+              <a:rPr lang="es" sz="1270">
+                <a:solidFill>
+                  <a:schemeClr val="dk1"/>
+                </a:solidFill>
+                <a:latin typeface="Impact"/>
+                <a:ea typeface="Impact"/>
+                <a:cs typeface="Impact"/>
+                <a:sym typeface="Impact"/>
+              </a:rPr>
+              <a:t>Sección: 002D</a:t>
+            </a:r>
+            <a:endParaRPr sz="1270">
+              <a:solidFill>
+                <a:schemeClr val="dk1"/>
+              </a:solidFill>
+              <a:latin typeface="Impact"/>
+              <a:ea typeface="Impact"/>
+              <a:cs typeface="Impact"/>
+              <a:sym typeface="Impact"/>
+            </a:endParaRPr>
+          </a:p>
+          <a:p>
+            <a:pPr indent="0" lvl="0" marL="0" rtl="0" algn="l">
+              <a:lnSpc>
+                <a:spcPct val="80000"/>
+              </a:lnSpc>
+              <a:spcBef>
+                <a:spcPts val="0"/>
+              </a:spcBef>
+              <a:spcAft>
+                <a:spcPts val="0"/>
+              </a:spcAft>
+              <a:buSzPts val="852"/>
+              <a:buNone/>
+            </a:pPr>
+            <a:r>
+              <a:rPr lang="es" sz="1270">
+                <a:solidFill>
+                  <a:schemeClr val="dk1"/>
+                </a:solidFill>
+                <a:latin typeface="Impact"/>
+                <a:ea typeface="Impact"/>
+                <a:cs typeface="Impact"/>
+                <a:sym typeface="Impact"/>
+              </a:rPr>
+              <a:t>Docentes: Jazna Meza, Juan Pablo Mellado</a:t>
+            </a:r>
+            <a:endParaRPr sz="1270">
+              <a:solidFill>
+                <a:schemeClr val="dk1"/>
+              </a:solidFill>
+              <a:latin typeface="Impact"/>
+              <a:ea typeface="Impact"/>
+              <a:cs typeface="Impact"/>
+              <a:sym typeface="Impact"/>
+            </a:endParaRPr>
+          </a:p>
+        </p:txBody>
+      </p:sp>
+      <p:pic>
+        <p:nvPicPr>
+          <p:cNvPr id="57" name="Google Shape;57;p13"/>
+          <p:cNvPicPr preferRelativeResize="0"/>
+          <p:nvPr/>
+        </p:nvPicPr>
+        <p:blipFill>
+          <a:blip r:embed="rId4">
+            <a:alphaModFix/>
+          </a:blip>
+          <a:stretch>
+            <a:fillRect/>
+          </a:stretch>
+        </p:blipFill>
+        <p:spPr>
+          <a:xfrm>
+            <a:off x="129850" y="96400"/>
+            <a:ext cx="1388475" cy="341325"/>
+          </a:xfrm>
+          <a:prstGeom prst="rect">
+            <a:avLst/>
+          </a:prstGeom>
+          <a:noFill/>
+          <a:ln>
+            <a:noFill/>
+          </a:ln>
+        </p:spPr>
+      </p:pic>
     </p:spTree>
   </p:cSld>
   <p:clrMapOvr>
@@ -6446,7 +6613,7 @@
   <p:cSld>
     <p:spTree>
       <p:nvGrpSpPr>
-        <p:cNvPr id="59" name="Shape 59"/>
+        <p:cNvPr id="61" name="Shape 61"/>
         <p:cNvGrpSpPr/>
         <p:nvPr/>
       </p:nvGrpSpPr>
@@ -6460,7 +6627,7 @@
       </p:grpSpPr>
       <p:sp>
         <p:nvSpPr>
-          <p:cNvPr id="60" name="Google Shape;60;p14"/>
+          <p:cNvPr id="62" name="Google Shape;62;p14"/>
           <p:cNvSpPr txBox="1"/>
           <p:nvPr>
             <p:ph type="title"/>
@@ -6504,7 +6671,7 @@
       </p:sp>
       <p:sp>
         <p:nvSpPr>
-          <p:cNvPr id="61" name="Google Shape;61;p14"/>
+          <p:cNvPr id="63" name="Google Shape;63;p14"/>
           <p:cNvSpPr txBox="1"/>
           <p:nvPr>
             <p:ph idx="1" type="body"/>
@@ -6750,7 +6917,7 @@
       </p:sp>
       <p:pic>
         <p:nvPicPr>
-          <p:cNvPr id="62" name="Google Shape;62;p14"/>
+          <p:cNvPr id="64" name="Google Shape;64;p14"/>
           <p:cNvPicPr preferRelativeResize="0"/>
           <p:nvPr/>
         </p:nvPicPr>
@@ -6778,7 +6945,7 @@
       </p:pic>
       <p:pic>
         <p:nvPicPr>
-          <p:cNvPr id="63" name="Google Shape;63;p14"/>
+          <p:cNvPr id="65" name="Google Shape;65;p14"/>
           <p:cNvPicPr preferRelativeResize="0"/>
           <p:nvPr/>
         </p:nvPicPr>
@@ -6806,7 +6973,7 @@
       </p:pic>
       <p:pic>
         <p:nvPicPr>
-          <p:cNvPr id="64" name="Google Shape;64;p14"/>
+          <p:cNvPr id="66" name="Google Shape;66;p14"/>
           <p:cNvPicPr preferRelativeResize="0"/>
           <p:nvPr/>
         </p:nvPicPr>
@@ -6845,7 +7012,7 @@
   <p:cSld>
     <p:spTree>
       <p:nvGrpSpPr>
-        <p:cNvPr id="68" name="Shape 68"/>
+        <p:cNvPr id="70" name="Shape 70"/>
         <p:cNvGrpSpPr/>
         <p:nvPr/>
       </p:nvGrpSpPr>
@@ -6859,7 +7026,7 @@
       </p:grpSpPr>
       <p:sp>
         <p:nvSpPr>
-          <p:cNvPr id="69" name="Google Shape;69;p15"/>
+          <p:cNvPr id="71" name="Google Shape;71;p15"/>
           <p:cNvSpPr txBox="1"/>
           <p:nvPr>
             <p:ph type="title"/>
@@ -6899,7 +7066,7 @@
       </p:sp>
       <p:sp>
         <p:nvSpPr>
-          <p:cNvPr id="70" name="Google Shape;70;p15"/>
+          <p:cNvPr id="72" name="Google Shape;72;p15"/>
           <p:cNvSpPr txBox="1"/>
           <p:nvPr>
             <p:ph idx="1" type="body"/>
@@ -7045,7 +7212,7 @@
       </p:sp>
       <p:pic>
         <p:nvPicPr>
-          <p:cNvPr id="71" name="Google Shape;71;p15"/>
+          <p:cNvPr id="73" name="Google Shape;73;p15"/>
           <p:cNvPicPr preferRelativeResize="0"/>
           <p:nvPr/>
         </p:nvPicPr>
@@ -7073,7 +7240,7 @@
       </p:pic>
       <p:pic>
         <p:nvPicPr>
-          <p:cNvPr id="72" name="Google Shape;72;p15"/>
+          <p:cNvPr id="74" name="Google Shape;74;p15"/>
           <p:cNvPicPr preferRelativeResize="0"/>
           <p:nvPr/>
         </p:nvPicPr>
@@ -7101,7 +7268,7 @@
       </p:pic>
       <p:pic>
         <p:nvPicPr>
-          <p:cNvPr id="73" name="Google Shape;73;p15"/>
+          <p:cNvPr id="75" name="Google Shape;75;p15"/>
           <p:cNvPicPr preferRelativeResize="0"/>
           <p:nvPr/>
         </p:nvPicPr>
@@ -7129,7 +7296,7 @@
       </p:pic>
       <p:pic>
         <p:nvPicPr>
-          <p:cNvPr id="74" name="Google Shape;74;p15"/>
+          <p:cNvPr id="76" name="Google Shape;76;p15"/>
           <p:cNvPicPr preferRelativeResize="0"/>
           <p:nvPr/>
         </p:nvPicPr>
@@ -7157,7 +7324,7 @@
       </p:pic>
       <p:pic>
         <p:nvPicPr>
-          <p:cNvPr id="75" name="Google Shape;75;p15"/>
+          <p:cNvPr id="77" name="Google Shape;77;p15"/>
           <p:cNvPicPr preferRelativeResize="0"/>
           <p:nvPr/>
         </p:nvPicPr>
@@ -7196,7 +7363,7 @@
   <p:cSld>
     <p:spTree>
       <p:nvGrpSpPr>
-        <p:cNvPr id="79" name="Shape 79"/>
+        <p:cNvPr id="81" name="Shape 81"/>
         <p:cNvGrpSpPr/>
         <p:nvPr/>
       </p:nvGrpSpPr>
@@ -7210,7 +7377,7 @@
       </p:grpSpPr>
       <p:sp>
         <p:nvSpPr>
-          <p:cNvPr id="80" name="Google Shape;80;p16"/>
+          <p:cNvPr id="82" name="Google Shape;82;p16"/>
           <p:cNvSpPr txBox="1"/>
           <p:nvPr>
             <p:ph type="title"/>
@@ -7250,7 +7417,7 @@
       </p:sp>
       <p:sp>
         <p:nvSpPr>
-          <p:cNvPr id="81" name="Google Shape;81;p16"/>
+          <p:cNvPr id="83" name="Google Shape;83;p16"/>
           <p:cNvSpPr txBox="1"/>
           <p:nvPr>
             <p:ph idx="1" type="body"/>
@@ -7434,7 +7601,7 @@
       </p:sp>
       <p:pic>
         <p:nvPicPr>
-          <p:cNvPr id="82" name="Google Shape;82;p16"/>
+          <p:cNvPr id="84" name="Google Shape;84;p16"/>
           <p:cNvPicPr preferRelativeResize="0"/>
           <p:nvPr/>
         </p:nvPicPr>
@@ -7462,7 +7629,7 @@
       </p:pic>
       <p:pic>
         <p:nvPicPr>
-          <p:cNvPr id="83" name="Google Shape;83;p16"/>
+          <p:cNvPr id="85" name="Google Shape;85;p16"/>
           <p:cNvPicPr preferRelativeResize="0"/>
           <p:nvPr/>
         </p:nvPicPr>
@@ -7501,7 +7668,7 @@
   <p:cSld>
     <p:spTree>
       <p:nvGrpSpPr>
-        <p:cNvPr id="87" name="Shape 87"/>
+        <p:cNvPr id="89" name="Shape 89"/>
         <p:cNvGrpSpPr/>
         <p:nvPr/>
       </p:nvGrpSpPr>
@@ -7515,7 +7682,7 @@
       </p:grpSpPr>
       <p:graphicFrame>
         <p:nvGraphicFramePr>
-          <p:cNvPr id="88" name="Google Shape;88;p17"/>
+          <p:cNvPr id="90" name="Google Shape;90;p17"/>
           <p:cNvGraphicFramePr/>
           <p:nvPr/>
         </p:nvGraphicFramePr>
@@ -7528,7 +7695,7 @@
             <a:tbl>
               <a:tblPr>
                 <a:noFill/>
-                <a:tableStyleId>{80451004-E752-4F8F-92FE-FEF90610C40E}</a:tableStyleId>
+                <a:tableStyleId>{CE9E4590-BC46-414C-962C-71655C175F73}</a:tableStyleId>
               </a:tblPr>
               <a:tblGrid>
                 <a:gridCol w="4194000"/>
@@ -8066,7 +8233,7 @@
       </p:graphicFrame>
       <p:pic>
         <p:nvPicPr>
-          <p:cNvPr id="89" name="Google Shape;89;p17"/>
+          <p:cNvPr id="91" name="Google Shape;91;p17"/>
           <p:cNvPicPr preferRelativeResize="0"/>
           <p:nvPr/>
         </p:nvPicPr>
@@ -8094,7 +8261,7 @@
       </p:pic>
       <p:pic>
         <p:nvPicPr>
-          <p:cNvPr id="90" name="Google Shape;90;p17"/>
+          <p:cNvPr id="92" name="Google Shape;92;p17"/>
           <p:cNvPicPr preferRelativeResize="0"/>
           <p:nvPr/>
         </p:nvPicPr>
@@ -8133,7 +8300,7 @@
   <p:cSld>
     <p:spTree>
       <p:nvGrpSpPr>
-        <p:cNvPr id="94" name="Shape 94"/>
+        <p:cNvPr id="96" name="Shape 96"/>
         <p:cNvGrpSpPr/>
         <p:nvPr/>
       </p:nvGrpSpPr>
@@ -8147,7 +8314,7 @@
       </p:grpSpPr>
       <p:sp>
         <p:nvSpPr>
-          <p:cNvPr id="95" name="Google Shape;95;p18"/>
+          <p:cNvPr id="97" name="Google Shape;97;p18"/>
           <p:cNvSpPr txBox="1"/>
           <p:nvPr>
             <p:ph type="title"/>
@@ -8187,7 +8354,7 @@
       </p:sp>
       <p:sp>
         <p:nvSpPr>
-          <p:cNvPr id="96" name="Google Shape;96;p18"/>
+          <p:cNvPr id="98" name="Google Shape;98;p18"/>
           <p:cNvSpPr/>
           <p:nvPr/>
         </p:nvSpPr>
@@ -8250,7 +8417,7 @@
       </p:sp>
       <p:sp>
         <p:nvSpPr>
-          <p:cNvPr id="97" name="Google Shape;97;p18"/>
+          <p:cNvPr id="99" name="Google Shape;99;p18"/>
           <p:cNvSpPr/>
           <p:nvPr/>
         </p:nvSpPr>
@@ -8313,7 +8480,7 @@
       </p:sp>
       <p:sp>
         <p:nvSpPr>
-          <p:cNvPr id="98" name="Google Shape;98;p18"/>
+          <p:cNvPr id="100" name="Google Shape;100;p18"/>
           <p:cNvSpPr/>
           <p:nvPr/>
         </p:nvSpPr>
@@ -8376,7 +8543,7 @@
       </p:sp>
       <p:sp>
         <p:nvSpPr>
-          <p:cNvPr id="99" name="Google Shape;99;p18"/>
+          <p:cNvPr id="101" name="Google Shape;101;p18"/>
           <p:cNvSpPr/>
           <p:nvPr/>
         </p:nvSpPr>
@@ -8439,7 +8606,7 @@
       </p:sp>
       <p:sp>
         <p:nvSpPr>
-          <p:cNvPr id="100" name="Google Shape;100;p18"/>
+          <p:cNvPr id="102" name="Google Shape;102;p18"/>
           <p:cNvSpPr/>
           <p:nvPr/>
         </p:nvSpPr>
@@ -8502,7 +8669,7 @@
       </p:sp>
       <p:sp>
         <p:nvSpPr>
-          <p:cNvPr id="101" name="Google Shape;101;p18"/>
+          <p:cNvPr id="103" name="Google Shape;103;p18"/>
           <p:cNvSpPr/>
           <p:nvPr/>
         </p:nvSpPr>
@@ -8565,10 +8732,10 @@
       </p:sp>
       <p:cxnSp>
         <p:nvCxnSpPr>
-          <p:cNvPr id="102" name="Google Shape;102;p18"/>
+          <p:cNvPr id="104" name="Google Shape;104;p18"/>
           <p:cNvCxnSpPr>
-            <a:stCxn id="96" idx="3"/>
-            <a:endCxn id="97" idx="3"/>
+            <a:stCxn id="98" idx="3"/>
+            <a:endCxn id="99" idx="3"/>
           </p:cNvCxnSpPr>
           <p:nvPr/>
         </p:nvCxnSpPr>
@@ -8596,10 +8763,10 @@
       </p:cxnSp>
       <p:cxnSp>
         <p:nvCxnSpPr>
-          <p:cNvPr id="103" name="Google Shape;103;p18"/>
+          <p:cNvPr id="105" name="Google Shape;105;p18"/>
           <p:cNvCxnSpPr>
-            <a:stCxn id="97" idx="1"/>
-            <a:endCxn id="98" idx="1"/>
+            <a:stCxn id="99" idx="1"/>
+            <a:endCxn id="100" idx="1"/>
           </p:cNvCxnSpPr>
           <p:nvPr/>
         </p:nvCxnSpPr>
@@ -8627,10 +8794,10 @@
       </p:cxnSp>
       <p:cxnSp>
         <p:nvCxnSpPr>
-          <p:cNvPr id="104" name="Google Shape;104;p18"/>
+          <p:cNvPr id="106" name="Google Shape;106;p18"/>
           <p:cNvCxnSpPr>
-            <a:stCxn id="98" idx="3"/>
-            <a:endCxn id="99" idx="3"/>
+            <a:stCxn id="100" idx="3"/>
+            <a:endCxn id="101" idx="3"/>
           </p:cNvCxnSpPr>
           <p:nvPr/>
         </p:nvCxnSpPr>
@@ -8658,10 +8825,10 @@
       </p:cxnSp>
       <p:cxnSp>
         <p:nvCxnSpPr>
-          <p:cNvPr id="105" name="Google Shape;105;p18"/>
+          <p:cNvPr id="107" name="Google Shape;107;p18"/>
           <p:cNvCxnSpPr>
-            <a:stCxn id="99" idx="1"/>
-            <a:endCxn id="100" idx="1"/>
+            <a:stCxn id="101" idx="1"/>
+            <a:endCxn id="102" idx="1"/>
           </p:cNvCxnSpPr>
           <p:nvPr/>
         </p:nvCxnSpPr>
@@ -8689,10 +8856,10 @@
       </p:cxnSp>
       <p:cxnSp>
         <p:nvCxnSpPr>
-          <p:cNvPr id="106" name="Google Shape;106;p18"/>
+          <p:cNvPr id="108" name="Google Shape;108;p18"/>
           <p:cNvCxnSpPr>
-            <a:stCxn id="100" idx="3"/>
-            <a:endCxn id="101" idx="3"/>
+            <a:stCxn id="102" idx="3"/>
+            <a:endCxn id="103" idx="3"/>
           </p:cNvCxnSpPr>
           <p:nvPr/>
         </p:nvCxnSpPr>
@@ -8720,7 +8887,7 @@
       </p:cxnSp>
       <p:graphicFrame>
         <p:nvGraphicFramePr>
-          <p:cNvPr id="107" name="Google Shape;107;p18"/>
+          <p:cNvPr id="109" name="Google Shape;109;p18"/>
           <p:cNvGraphicFramePr/>
           <p:nvPr/>
         </p:nvGraphicFramePr>
@@ -8733,7 +8900,7 @@
             <a:tbl>
               <a:tblPr>
                 <a:noFill/>
-                <a:tableStyleId>{80451004-E752-4F8F-92FE-FEF90610C40E}</a:tableStyleId>
+                <a:tableStyleId>{CE9E4590-BC46-414C-962C-71655C175F73}</a:tableStyleId>
               </a:tblPr>
               <a:tblGrid>
                 <a:gridCol w="2258450"/>
@@ -9669,7 +9836,7 @@
       </p:graphicFrame>
       <p:cxnSp>
         <p:nvCxnSpPr>
-          <p:cNvPr id="108" name="Google Shape;108;p18"/>
+          <p:cNvPr id="110" name="Google Shape;110;p18"/>
           <p:cNvCxnSpPr/>
           <p:nvPr/>
         </p:nvCxnSpPr>
@@ -9695,7 +9862,7 @@
       </p:cxnSp>
       <p:cxnSp>
         <p:nvCxnSpPr>
-          <p:cNvPr id="109" name="Google Shape;109;p18"/>
+          <p:cNvPr id="111" name="Google Shape;111;p18"/>
           <p:cNvCxnSpPr/>
           <p:nvPr/>
         </p:nvCxnSpPr>
@@ -9721,7 +9888,7 @@
       </p:cxnSp>
       <p:cxnSp>
         <p:nvCxnSpPr>
-          <p:cNvPr id="110" name="Google Shape;110;p18"/>
+          <p:cNvPr id="112" name="Google Shape;112;p18"/>
           <p:cNvCxnSpPr/>
           <p:nvPr/>
         </p:nvCxnSpPr>
@@ -9747,7 +9914,7 @@
       </p:cxnSp>
       <p:cxnSp>
         <p:nvCxnSpPr>
-          <p:cNvPr id="111" name="Google Shape;111;p18"/>
+          <p:cNvPr id="113" name="Google Shape;113;p18"/>
           <p:cNvCxnSpPr/>
           <p:nvPr/>
         </p:nvCxnSpPr>
@@ -9773,7 +9940,7 @@
       </p:cxnSp>
       <p:cxnSp>
         <p:nvCxnSpPr>
-          <p:cNvPr id="112" name="Google Shape;112;p18"/>
+          <p:cNvPr id="114" name="Google Shape;114;p18"/>
           <p:cNvCxnSpPr/>
           <p:nvPr/>
         </p:nvCxnSpPr>
@@ -9799,7 +9966,7 @@
       </p:cxnSp>
       <p:cxnSp>
         <p:nvCxnSpPr>
-          <p:cNvPr id="113" name="Google Shape;113;p18"/>
+          <p:cNvPr id="115" name="Google Shape;115;p18"/>
           <p:cNvCxnSpPr/>
           <p:nvPr/>
         </p:nvCxnSpPr>
@@ -9836,7 +10003,7 @@
   <p:cSld>
     <p:spTree>
       <p:nvGrpSpPr>
-        <p:cNvPr id="117" name="Shape 117"/>
+        <p:cNvPr id="119" name="Shape 119"/>
         <p:cNvGrpSpPr/>
         <p:nvPr/>
       </p:nvGrpSpPr>
@@ -9850,7 +10017,7 @@
       </p:grpSpPr>
       <p:sp>
         <p:nvSpPr>
-          <p:cNvPr id="118" name="Google Shape;118;p19"/>
+          <p:cNvPr id="120" name="Google Shape;120;p19"/>
           <p:cNvSpPr txBox="1"/>
           <p:nvPr>
             <p:ph type="title"/>
@@ -9890,7 +10057,7 @@
       </p:sp>
       <p:pic>
         <p:nvPicPr>
-          <p:cNvPr id="119" name="Google Shape;119;p19"/>
+          <p:cNvPr id="121" name="Google Shape;121;p19"/>
           <p:cNvPicPr preferRelativeResize="0"/>
           <p:nvPr/>
         </p:nvPicPr>
@@ -9929,7 +10096,7 @@
   <p:cSld>
     <p:spTree>
       <p:nvGrpSpPr>
-        <p:cNvPr id="123" name="Shape 123"/>
+        <p:cNvPr id="125" name="Shape 125"/>
         <p:cNvGrpSpPr/>
         <p:nvPr/>
       </p:nvGrpSpPr>
@@ -9943,7 +10110,7 @@
       </p:grpSpPr>
       <p:sp>
         <p:nvSpPr>
-          <p:cNvPr id="124" name="Google Shape;124;p20"/>
+          <p:cNvPr id="126" name="Google Shape;126;p20"/>
           <p:cNvSpPr/>
           <p:nvPr/>
         </p:nvSpPr>
@@ -9992,7 +10159,7 @@
       </p:sp>
       <p:sp>
         <p:nvSpPr>
-          <p:cNvPr id="125" name="Google Shape;125;p20"/>
+          <p:cNvPr id="127" name="Google Shape;127;p20"/>
           <p:cNvSpPr txBox="1"/>
           <p:nvPr>
             <p:ph type="title"/>
@@ -10032,7 +10199,7 @@
       </p:sp>
       <p:sp>
         <p:nvSpPr>
-          <p:cNvPr id="126" name="Google Shape;126;p20"/>
+          <p:cNvPr id="128" name="Google Shape;128;p20"/>
           <p:cNvSpPr/>
           <p:nvPr/>
         </p:nvSpPr>
@@ -10084,7 +10251,7 @@
       </p:sp>
       <p:sp>
         <p:nvSpPr>
-          <p:cNvPr id="127" name="Google Shape;127;p20"/>
+          <p:cNvPr id="129" name="Google Shape;129;p20"/>
           <p:cNvSpPr/>
           <p:nvPr/>
         </p:nvSpPr>
@@ -10136,7 +10303,7 @@
       </p:sp>
       <p:sp>
         <p:nvSpPr>
-          <p:cNvPr id="128" name="Google Shape;128;p20"/>
+          <p:cNvPr id="130" name="Google Shape;130;p20"/>
           <p:cNvSpPr/>
           <p:nvPr/>
         </p:nvSpPr>
@@ -10188,7 +10355,7 @@
       </p:sp>
       <p:sp>
         <p:nvSpPr>
-          <p:cNvPr id="129" name="Google Shape;129;p20"/>
+          <p:cNvPr id="131" name="Google Shape;131;p20"/>
           <p:cNvSpPr/>
           <p:nvPr/>
         </p:nvSpPr>
@@ -10240,7 +10407,7 @@
       </p:sp>
       <p:sp>
         <p:nvSpPr>
-          <p:cNvPr id="130" name="Google Shape;130;p20"/>
+          <p:cNvPr id="132" name="Google Shape;132;p20"/>
           <p:cNvSpPr/>
           <p:nvPr/>
         </p:nvSpPr>
@@ -10292,7 +10459,7 @@
       </p:sp>
       <p:sp>
         <p:nvSpPr>
-          <p:cNvPr id="131" name="Google Shape;131;p20"/>
+          <p:cNvPr id="133" name="Google Shape;133;p20"/>
           <p:cNvSpPr/>
           <p:nvPr/>
         </p:nvSpPr>
@@ -10344,7 +10511,7 @@
       </p:sp>
       <p:pic>
         <p:nvPicPr>
-          <p:cNvPr id="132" name="Google Shape;132;p20"/>
+          <p:cNvPr id="134" name="Google Shape;134;p20"/>
           <p:cNvPicPr preferRelativeResize="0"/>
           <p:nvPr/>
         </p:nvPicPr>
@@ -10383,7 +10550,7 @@
   <p:cSld>
     <p:spTree>
       <p:nvGrpSpPr>
-        <p:cNvPr id="136" name="Shape 136"/>
+        <p:cNvPr id="138" name="Shape 138"/>
         <p:cNvGrpSpPr/>
         <p:nvPr/>
       </p:nvGrpSpPr>
@@ -10397,7 +10564,7 @@
       </p:grpSpPr>
       <p:sp>
         <p:nvSpPr>
-          <p:cNvPr id="137" name="Google Shape;137;p21"/>
+          <p:cNvPr id="139" name="Google Shape;139;p21"/>
           <p:cNvSpPr txBox="1"/>
           <p:nvPr>
             <p:ph type="title"/>
@@ -10437,7 +10604,7 @@
       </p:sp>
       <p:pic>
         <p:nvPicPr>
-          <p:cNvPr id="138" name="Google Shape;138;p21" title="78155-icons-light-idea-computer-lighting-incandescent-bulb.png"/>
+          <p:cNvPr id="140" name="Google Shape;140;p21" title="78155-icons-light-idea-computer-lighting-incandescent-bulb.png"/>
           <p:cNvPicPr preferRelativeResize="0"/>
           <p:nvPr/>
         </p:nvPicPr>
@@ -10465,7 +10632,7 @@
       </p:pic>
       <p:pic>
         <p:nvPicPr>
-          <p:cNvPr id="139" name="Google Shape;139;p21"/>
+          <p:cNvPr id="141" name="Google Shape;141;p21"/>
           <p:cNvPicPr preferRelativeResize="0"/>
           <p:nvPr/>
         </p:nvPicPr>
@@ -10493,7 +10660,7 @@
       </p:pic>
       <p:pic>
         <p:nvPicPr>
-          <p:cNvPr id="140" name="Google Shape;140;p21" title="Imagenes_Pensativas-removebg-preview.png"/>
+          <p:cNvPr id="142" name="Google Shape;142;p21" title="Imagenes_Pensativas-removebg-preview.png"/>
           <p:cNvPicPr preferRelativeResize="0"/>
           <p:nvPr/>
         </p:nvPicPr>
@@ -10528,6 +10695,285 @@
 </file>
 
 <file path=ppt/theme/theme1.xml><?xml version="1.0" encoding="utf-8"?>
+<a:theme xmlns:a="http://schemas.openxmlformats.org/drawingml/2006/main" xmlns:r="http://schemas.openxmlformats.org/officeDocument/2006/relationships" name="Simple Dark">
+  <a:themeElements>
+    <a:clrScheme name="Simple Dark">
+      <a:dk1>
+        <a:srgbClr val="FFFFFF"/>
+      </a:dk1>
+      <a:lt1>
+        <a:srgbClr val="212121"/>
+      </a:lt1>
+      <a:dk2>
+        <a:srgbClr val="303030"/>
+      </a:dk2>
+      <a:lt2>
+        <a:srgbClr val="ADADAD"/>
+      </a:lt2>
+      <a:accent1>
+        <a:srgbClr val="009688"/>
+      </a:accent1>
+      <a:accent2>
+        <a:srgbClr val="EEEEEE"/>
+      </a:accent2>
+      <a:accent3>
+        <a:srgbClr val="78909C"/>
+      </a:accent3>
+      <a:accent4>
+        <a:srgbClr val="FFAB40"/>
+      </a:accent4>
+      <a:accent5>
+        <a:srgbClr val="4DD0E1"/>
+      </a:accent5>
+      <a:accent6>
+        <a:srgbClr val="EEFF41"/>
+      </a:accent6>
+      <a:hlink>
+        <a:srgbClr val="4DD0E1"/>
+      </a:hlink>
+      <a:folHlink>
+        <a:srgbClr val="4DD0E1"/>
+      </a:folHlink>
+    </a:clrScheme>
+    <a:fontScheme name="Office">
+      <a:majorFont>
+        <a:latin typeface="Arial"/>
+        <a:ea typeface=""/>
+        <a:cs typeface=""/>
+        <a:font script="Jpan" typeface="ＭＳ Ｐゴシック"/>
+        <a:font script="Hang" typeface="맑은 고딕"/>
+        <a:font script="Hans" typeface="宋体"/>
+        <a:font script="Hant" typeface="新細明體"/>
+        <a:font script="Arab" typeface="Times New Roman"/>
+        <a:font script="Hebr" typeface="Times New Roman"/>
+        <a:font script="Thai" typeface="Angsana New"/>
+        <a:font script="Ethi" typeface="Nyala"/>
+        <a:font script="Beng" typeface="Vrinda"/>
+        <a:font script="Gujr" typeface="Shruti"/>
+        <a:font script="Khmr" typeface="MoolBoran"/>
+        <a:font script="Knda" typeface="Tunga"/>
+        <a:font script="Guru" typeface="Raavi"/>
+        <a:font script="Cans" typeface="Euphemia"/>
+        <a:font script="Cher" typeface="Plantagenet Cherokee"/>
+        <a:font script="Yiii" typeface="Microsoft Yi Baiti"/>
+        <a:font script="Tibt" typeface="Microsoft Himalaya"/>
+        <a:font script="Thaa" typeface="MV Boli"/>
+        <a:font script="Deva" typeface="Mangal"/>
+        <a:font script="Telu" typeface="Gautami"/>
+        <a:font script="Taml" typeface="Latha"/>
+        <a:font script="Syrc" typeface="Estrangelo Edessa"/>
+        <a:font script="Orya" typeface="Kalinga"/>
+        <a:font script="Mlym" typeface="Kartika"/>
+        <a:font script="Laoo" typeface="DokChampa"/>
+        <a:font script="Sinh" typeface="Iskoola Pota"/>
+        <a:font script="Mong" typeface="Mongolian Baiti"/>
+        <a:font script="Viet" typeface="Times New Roman"/>
+        <a:font script="Uigh" typeface="Microsoft Uighur"/>
+        <a:font script="Geor" typeface="Sylfaen"/>
+      </a:majorFont>
+      <a:minorFont>
+        <a:latin typeface="Arial"/>
+        <a:ea typeface=""/>
+        <a:cs typeface=""/>
+        <a:font script="Jpan" typeface="ＭＳ Ｐゴシック"/>
+        <a:font script="Hang" typeface="맑은 고딕"/>
+        <a:font script="Hans" typeface="宋体"/>
+        <a:font script="Hant" typeface="新細明體"/>
+        <a:font script="Arab" typeface="Arial"/>
+        <a:font script="Hebr" typeface="Arial"/>
+        <a:font script="Thai" typeface="Cordia New"/>
+        <a:font script="Ethi" typeface="Nyala"/>
+        <a:font script="Beng" typeface="Vrinda"/>
+        <a:font script="Gujr" typeface="Shruti"/>
+        <a:font script="Khmr" typeface="DaunPenh"/>
+        <a:font script="Knda" typeface="Tunga"/>
+        <a:font script="Guru" typeface="Raavi"/>
+        <a:font script="Cans" typeface="Euphemia"/>
+        <a:font script="Cher" typeface="Plantagenet Cherokee"/>
+        <a:font script="Yiii" typeface="Microsoft Yi Baiti"/>
+        <a:font script="Tibt" typeface="Microsoft Himalaya"/>
+        <a:font script="Thaa" typeface="MV Boli"/>
+        <a:font script="Deva" typeface="Mangal"/>
+        <a:font script="Telu" typeface="Gautami"/>
+        <a:font script="Taml" typeface="Latha"/>
+        <a:font script="Syrc" typeface="Estrangelo Edessa"/>
+        <a:font script="Orya" typeface="Kalinga"/>
+        <a:font script="Mlym" typeface="Kartika"/>
+        <a:font script="Laoo" typeface="DokChampa"/>
+        <a:font script="Sinh" typeface="Iskoola Pota"/>
+        <a:font script="Mong" typeface="Mongolian Baiti"/>
+        <a:font script="Viet" typeface="Arial"/>
+        <a:font script="Uigh" typeface="Microsoft Uighur"/>
+        <a:font script="Geor" typeface="Sylfaen"/>
+      </a:minorFont>
+    </a:fontScheme>
+    <a:fmtScheme name="Office">
+      <a:fillStyleLst>
+        <a:solidFill>
+          <a:schemeClr val="phClr"/>
+        </a:solidFill>
+        <a:gradFill rotWithShape="1">
+          <a:gsLst>
+            <a:gs pos="0">
+              <a:schemeClr val="phClr">
+                <a:tint val="50000"/>
+                <a:satMod val="300000"/>
+              </a:schemeClr>
+            </a:gs>
+            <a:gs pos="35000">
+              <a:schemeClr val="phClr">
+                <a:tint val="37000"/>
+                <a:satMod val="300000"/>
+              </a:schemeClr>
+            </a:gs>
+            <a:gs pos="100000">
+              <a:schemeClr val="phClr">
+                <a:tint val="15000"/>
+                <a:satMod val="350000"/>
+              </a:schemeClr>
+            </a:gs>
+          </a:gsLst>
+          <a:lin ang="16200000" scaled="1"/>
+        </a:gradFill>
+        <a:gradFill rotWithShape="1">
+          <a:gsLst>
+            <a:gs pos="0">
+              <a:schemeClr val="phClr">
+                <a:tint val="100000"/>
+                <a:shade val="100000"/>
+                <a:satMod val="130000"/>
+              </a:schemeClr>
+            </a:gs>
+            <a:gs pos="100000">
+              <a:schemeClr val="phClr">
+                <a:tint val="50000"/>
+                <a:shade val="100000"/>
+                <a:satMod val="350000"/>
+              </a:schemeClr>
+            </a:gs>
+          </a:gsLst>
+          <a:lin ang="16200000" scaled="0"/>
+        </a:gradFill>
+      </a:fillStyleLst>
+      <a:lnStyleLst>
+        <a:ln w="9525" cap="flat" cmpd="sng" algn="ctr">
+          <a:solidFill>
+            <a:schemeClr val="phClr">
+              <a:shade val="95000"/>
+              <a:satMod val="105000"/>
+            </a:schemeClr>
+          </a:solidFill>
+          <a:prstDash val="solid"/>
+        </a:ln>
+        <a:ln w="25400" cap="flat" cmpd="sng" algn="ctr">
+          <a:solidFill>
+            <a:schemeClr val="phClr"/>
+          </a:solidFill>
+          <a:prstDash val="solid"/>
+        </a:ln>
+        <a:ln w="38100" cap="flat" cmpd="sng" algn="ctr">
+          <a:solidFill>
+            <a:schemeClr val="phClr"/>
+          </a:solidFill>
+          <a:prstDash val="solid"/>
+        </a:ln>
+      </a:lnStyleLst>
+      <a:effectStyleLst>
+        <a:effectStyle>
+          <a:effectLst>
+            <a:outerShdw blurRad="40000" dist="20000" dir="5400000" rotWithShape="0">
+              <a:srgbClr val="000000">
+                <a:alpha val="38000"/>
+              </a:srgbClr>
+            </a:outerShdw>
+          </a:effectLst>
+        </a:effectStyle>
+        <a:effectStyle>
+          <a:effectLst>
+            <a:outerShdw blurRad="40000" dist="23000" dir="5400000" rotWithShape="0">
+              <a:srgbClr val="000000">
+                <a:alpha val="35000"/>
+              </a:srgbClr>
+            </a:outerShdw>
+          </a:effectLst>
+        </a:effectStyle>
+        <a:effectStyle>
+          <a:effectLst>
+            <a:outerShdw blurRad="40000" dist="23000" dir="5400000" rotWithShape="0">
+              <a:srgbClr val="000000">
+                <a:alpha val="35000"/>
+              </a:srgbClr>
+            </a:outerShdw>
+          </a:effectLst>
+          <a:scene3d>
+            <a:camera prst="orthographicFront">
+              <a:rot lat="0" lon="0" rev="0"/>
+            </a:camera>
+            <a:lightRig rig="threePt" dir="t">
+              <a:rot lat="0" lon="0" rev="1200000"/>
+            </a:lightRig>
+          </a:scene3d>
+          <a:sp3d>
+            <a:bevelT w="63500" h="25400"/>
+          </a:sp3d>
+        </a:effectStyle>
+      </a:effectStyleLst>
+      <a:bgFillStyleLst>
+        <a:solidFill>
+          <a:schemeClr val="phClr"/>
+        </a:solidFill>
+        <a:gradFill rotWithShape="1">
+          <a:gsLst>
+            <a:gs pos="0">
+              <a:schemeClr val="phClr">
+                <a:tint val="40000"/>
+                <a:satMod val="350000"/>
+              </a:schemeClr>
+            </a:gs>
+            <a:gs pos="40000">
+              <a:schemeClr val="phClr">
+                <a:tint val="45000"/>
+                <a:shade val="99000"/>
+                <a:satMod val="350000"/>
+              </a:schemeClr>
+            </a:gs>
+            <a:gs pos="100000">
+              <a:schemeClr val="phClr">
+                <a:shade val="20000"/>
+                <a:satMod val="255000"/>
+              </a:schemeClr>
+            </a:gs>
+          </a:gsLst>
+          <a:path path="circle">
+            <a:fillToRect l="50000" t="-80000" r="50000" b="180000"/>
+          </a:path>
+        </a:gradFill>
+        <a:gradFill rotWithShape="1">
+          <a:gsLst>
+            <a:gs pos="0">
+              <a:schemeClr val="phClr">
+                <a:tint val="80000"/>
+                <a:satMod val="300000"/>
+              </a:schemeClr>
+            </a:gs>
+            <a:gs pos="100000">
+              <a:schemeClr val="phClr">
+                <a:shade val="30000"/>
+                <a:satMod val="200000"/>
+              </a:schemeClr>
+            </a:gs>
+          </a:gsLst>
+          <a:path path="circle">
+            <a:fillToRect l="50000" t="50000" r="50000" b="50000"/>
+          </a:path>
+        </a:gradFill>
+      </a:bgFillStyleLst>
+    </a:fmtScheme>
+  </a:themeElements>
+</a:theme>
+</file>
+
+<file path=ppt/theme/theme2.xml><?xml version="1.0" encoding="utf-8"?>
 <a:theme xmlns:a="http://schemas.openxmlformats.org/drawingml/2006/main" xmlns:r="http://schemas.openxmlformats.org/officeDocument/2006/relationships">
   <a:themeElements>
     <a:clrScheme name="Default">
@@ -10804,283 +11250,4 @@
     </a:fmtScheme>
   </a:themeElements>
 </a:theme>
-</file>
-
-<file path=ppt/theme/theme2.xml><?xml version="1.0" encoding="utf-8"?>
-<a:theme xmlns:a="http://schemas.openxmlformats.org/drawingml/2006/main" xmlns:r="http://schemas.openxmlformats.org/officeDocument/2006/relationships" name="Simple Dark">
-  <a:themeElements>
-    <a:clrScheme name="Simple Dark">
-      <a:dk1>
-        <a:srgbClr val="FFFFFF"/>
-      </a:dk1>
-      <a:lt1>
-        <a:srgbClr val="212121"/>
-      </a:lt1>
-      <a:dk2>
-        <a:srgbClr val="303030"/>
-      </a:dk2>
-      <a:lt2>
-        <a:srgbClr val="ADADAD"/>
-      </a:lt2>
-      <a:accent1>
-        <a:srgbClr val="009688"/>
-      </a:accent1>
-      <a:accent2>
-        <a:srgbClr val="EEEEEE"/>
-      </a:accent2>
-      <a:accent3>
-        <a:srgbClr val="78909C"/>
-      </a:accent3>
-      <a:accent4>
-        <a:srgbClr val="FFAB40"/>
-      </a:accent4>
-      <a:accent5>
-        <a:srgbClr val="4DD0E1"/>
-      </a:accent5>
-      <a:accent6>
-        <a:srgbClr val="EEFF41"/>
-      </a:accent6>
-      <a:hlink>
-        <a:srgbClr val="4DD0E1"/>
-      </a:hlink>
-      <a:folHlink>
-        <a:srgbClr val="4DD0E1"/>
-      </a:folHlink>
-    </a:clrScheme>
-    <a:fontScheme name="Office">
-      <a:majorFont>
-        <a:latin typeface="Arial"/>
-        <a:ea typeface=""/>
-        <a:cs typeface=""/>
-        <a:font script="Jpan" typeface="ＭＳ Ｐゴシック"/>
-        <a:font script="Hang" typeface="맑은 고딕"/>
-        <a:font script="Hans" typeface="宋体"/>
-        <a:font script="Hant" typeface="新細明體"/>
-        <a:font script="Arab" typeface="Times New Roman"/>
-        <a:font script="Hebr" typeface="Times New Roman"/>
-        <a:font script="Thai" typeface="Angsana New"/>
-        <a:font script="Ethi" typeface="Nyala"/>
-        <a:font script="Beng" typeface="Vrinda"/>
-        <a:font script="Gujr" typeface="Shruti"/>
-        <a:font script="Khmr" typeface="MoolBoran"/>
-        <a:font script="Knda" typeface="Tunga"/>
-        <a:font script="Guru" typeface="Raavi"/>
-        <a:font script="Cans" typeface="Euphemia"/>
-        <a:font script="Cher" typeface="Plantagenet Cherokee"/>
-        <a:font script="Yiii" typeface="Microsoft Yi Baiti"/>
-        <a:font script="Tibt" typeface="Microsoft Himalaya"/>
-        <a:font script="Thaa" typeface="MV Boli"/>
-        <a:font script="Deva" typeface="Mangal"/>
-        <a:font script="Telu" typeface="Gautami"/>
-        <a:font script="Taml" typeface="Latha"/>
-        <a:font script="Syrc" typeface="Estrangelo Edessa"/>
-        <a:font script="Orya" typeface="Kalinga"/>
-        <a:font script="Mlym" typeface="Kartika"/>
-        <a:font script="Laoo" typeface="DokChampa"/>
-        <a:font script="Sinh" typeface="Iskoola Pota"/>
-        <a:font script="Mong" typeface="Mongolian Baiti"/>
-        <a:font script="Viet" typeface="Times New Roman"/>
-        <a:font script="Uigh" typeface="Microsoft Uighur"/>
-        <a:font script="Geor" typeface="Sylfaen"/>
-      </a:majorFont>
-      <a:minorFont>
-        <a:latin typeface="Arial"/>
-        <a:ea typeface=""/>
-        <a:cs typeface=""/>
-        <a:font script="Jpan" typeface="ＭＳ Ｐゴシック"/>
-        <a:font script="Hang" typeface="맑은 고딕"/>
-        <a:font script="Hans" typeface="宋体"/>
-        <a:font script="Hant" typeface="新細明體"/>
-        <a:font script="Arab" typeface="Arial"/>
-        <a:font script="Hebr" typeface="Arial"/>
-        <a:font script="Thai" typeface="Cordia New"/>
-        <a:font script="Ethi" typeface="Nyala"/>
-        <a:font script="Beng" typeface="Vrinda"/>
-        <a:font script="Gujr" typeface="Shruti"/>
-        <a:font script="Khmr" typeface="DaunPenh"/>
-        <a:font script="Knda" typeface="Tunga"/>
-        <a:font script="Guru" typeface="Raavi"/>
-        <a:font script="Cans" typeface="Euphemia"/>
-        <a:font script="Cher" typeface="Plantagenet Cherokee"/>
-        <a:font script="Yiii" typeface="Microsoft Yi Baiti"/>
-        <a:font script="Tibt" typeface="Microsoft Himalaya"/>
-        <a:font script="Thaa" typeface="MV Boli"/>
-        <a:font script="Deva" typeface="Mangal"/>
-        <a:font script="Telu" typeface="Gautami"/>
-        <a:font script="Taml" typeface="Latha"/>
-        <a:font script="Syrc" typeface="Estrangelo Edessa"/>
-        <a:font script="Orya" typeface="Kalinga"/>
-        <a:font script="Mlym" typeface="Kartika"/>
-        <a:font script="Laoo" typeface="DokChampa"/>
-        <a:font script="Sinh" typeface="Iskoola Pota"/>
-        <a:font script="Mong" typeface="Mongolian Baiti"/>
-        <a:font script="Viet" typeface="Arial"/>
-        <a:font script="Uigh" typeface="Microsoft Uighur"/>
-        <a:font script="Geor" typeface="Sylfaen"/>
-      </a:minorFont>
-    </a:fontScheme>
-    <a:fmtScheme name="Office">
-      <a:fillStyleLst>
-        <a:solidFill>
-          <a:schemeClr val="phClr"/>
-        </a:solidFill>
-        <a:gradFill rotWithShape="1">
-          <a:gsLst>
-            <a:gs pos="0">
-              <a:schemeClr val="phClr">
-                <a:tint val="50000"/>
-                <a:satMod val="300000"/>
-              </a:schemeClr>
-            </a:gs>
-            <a:gs pos="35000">
-              <a:schemeClr val="phClr">
-                <a:tint val="37000"/>
-                <a:satMod val="300000"/>
-              </a:schemeClr>
-            </a:gs>
-            <a:gs pos="100000">
-              <a:schemeClr val="phClr">
-                <a:tint val="15000"/>
-                <a:satMod val="350000"/>
-              </a:schemeClr>
-            </a:gs>
-          </a:gsLst>
-          <a:lin ang="16200000" scaled="1"/>
-        </a:gradFill>
-        <a:gradFill rotWithShape="1">
-          <a:gsLst>
-            <a:gs pos="0">
-              <a:schemeClr val="phClr">
-                <a:tint val="100000"/>
-                <a:shade val="100000"/>
-                <a:satMod val="130000"/>
-              </a:schemeClr>
-            </a:gs>
-            <a:gs pos="100000">
-              <a:schemeClr val="phClr">
-                <a:tint val="50000"/>
-                <a:shade val="100000"/>
-                <a:satMod val="350000"/>
-              </a:schemeClr>
-            </a:gs>
-          </a:gsLst>
-          <a:lin ang="16200000" scaled="0"/>
-        </a:gradFill>
-      </a:fillStyleLst>
-      <a:lnStyleLst>
-        <a:ln w="9525" cap="flat" cmpd="sng" algn="ctr">
-          <a:solidFill>
-            <a:schemeClr val="phClr">
-              <a:shade val="95000"/>
-              <a:satMod val="105000"/>
-            </a:schemeClr>
-          </a:solidFill>
-          <a:prstDash val="solid"/>
-        </a:ln>
-        <a:ln w="25400" cap="flat" cmpd="sng" algn="ctr">
-          <a:solidFill>
-            <a:schemeClr val="phClr"/>
-          </a:solidFill>
-          <a:prstDash val="solid"/>
-        </a:ln>
-        <a:ln w="38100" cap="flat" cmpd="sng" algn="ctr">
-          <a:solidFill>
-            <a:schemeClr val="phClr"/>
-          </a:solidFill>
-          <a:prstDash val="solid"/>
-        </a:ln>
-      </a:lnStyleLst>
-      <a:effectStyleLst>
-        <a:effectStyle>
-          <a:effectLst>
-            <a:outerShdw blurRad="40000" dist="20000" dir="5400000" rotWithShape="0">
-              <a:srgbClr val="000000">
-                <a:alpha val="38000"/>
-              </a:srgbClr>
-            </a:outerShdw>
-          </a:effectLst>
-        </a:effectStyle>
-        <a:effectStyle>
-          <a:effectLst>
-            <a:outerShdw blurRad="40000" dist="23000" dir="5400000" rotWithShape="0">
-              <a:srgbClr val="000000">
-                <a:alpha val="35000"/>
-              </a:srgbClr>
-            </a:outerShdw>
-          </a:effectLst>
-        </a:effectStyle>
-        <a:effectStyle>
-          <a:effectLst>
-            <a:outerShdw blurRad="40000" dist="23000" dir="5400000" rotWithShape="0">
-              <a:srgbClr val="000000">
-                <a:alpha val="35000"/>
-              </a:srgbClr>
-            </a:outerShdw>
-          </a:effectLst>
-          <a:scene3d>
-            <a:camera prst="orthographicFront">
-              <a:rot lat="0" lon="0" rev="0"/>
-            </a:camera>
-            <a:lightRig rig="threePt" dir="t">
-              <a:rot lat="0" lon="0" rev="1200000"/>
-            </a:lightRig>
-          </a:scene3d>
-          <a:sp3d>
-            <a:bevelT w="63500" h="25400"/>
-          </a:sp3d>
-        </a:effectStyle>
-      </a:effectStyleLst>
-      <a:bgFillStyleLst>
-        <a:solidFill>
-          <a:schemeClr val="phClr"/>
-        </a:solidFill>
-        <a:gradFill rotWithShape="1">
-          <a:gsLst>
-            <a:gs pos="0">
-              <a:schemeClr val="phClr">
-                <a:tint val="40000"/>
-                <a:satMod val="350000"/>
-              </a:schemeClr>
-            </a:gs>
-            <a:gs pos="40000">
-              <a:schemeClr val="phClr">
-                <a:tint val="45000"/>
-                <a:shade val="99000"/>
-                <a:satMod val="350000"/>
-              </a:schemeClr>
-            </a:gs>
-            <a:gs pos="100000">
-              <a:schemeClr val="phClr">
-                <a:shade val="20000"/>
-                <a:satMod val="255000"/>
-              </a:schemeClr>
-            </a:gs>
-          </a:gsLst>
-          <a:path path="circle">
-            <a:fillToRect l="50000" t="-80000" r="50000" b="180000"/>
-          </a:path>
-        </a:gradFill>
-        <a:gradFill rotWithShape="1">
-          <a:gsLst>
-            <a:gs pos="0">
-              <a:schemeClr val="phClr">
-                <a:tint val="80000"/>
-                <a:satMod val="300000"/>
-              </a:schemeClr>
-            </a:gs>
-            <a:gs pos="100000">
-              <a:schemeClr val="phClr">
-                <a:shade val="30000"/>
-                <a:satMod val="200000"/>
-              </a:schemeClr>
-            </a:gs>
-          </a:gsLst>
-          <a:path path="circle">
-            <a:fillToRect l="50000" t="50000" r="50000" b="50000"/>
-          </a:path>
-        </a:gradFill>
-      </a:bgFillStyleLst>
-    </a:fmtScheme>
-  </a:themeElements>
-</a:theme>
 </file>
</xml_diff>